<commit_message>
updating links in PowerPoint
</commit_message>
<xml_diff>
--- a/JS Overload.pptx
+++ b/JS Overload.pptx
@@ -294,7 +294,7 @@
           <a:p>
             <a:fld id="{48A87A34-81AB-432B-8DAE-1953F412C126}" type="datetimeFigureOut">
               <a:rPr lang="en-US" dirty="0"/>
-              <a:t>7/3/2019</a:t>
+              <a:t>7/9/2019</a:t>
             </a:fld>
             <a:endParaRPr lang="en-US" dirty="0"/>
           </a:p>
@@ -556,7 +556,7 @@
           <a:p>
             <a:fld id="{48A87A34-81AB-432B-8DAE-1953F412C126}" type="datetimeFigureOut">
               <a:rPr lang="en-US" dirty="0"/>
-              <a:t>7/3/2019</a:t>
+              <a:t>7/9/2019</a:t>
             </a:fld>
             <a:endParaRPr lang="en-US" dirty="0"/>
           </a:p>
@@ -783,7 +783,7 @@
             <a:fld id="{48A87A34-81AB-432B-8DAE-1953F412C126}" type="datetimeFigureOut">
               <a:rPr lang="en-US" dirty="0"/>
               <a:pPr/>
-              <a:t>7/3/2019</a:t>
+              <a:t>7/9/2019</a:t>
             </a:fld>
             <a:endParaRPr lang="en-US" dirty="0"/>
           </a:p>
@@ -1089,7 +1089,7 @@
             <a:fld id="{48A87A34-81AB-432B-8DAE-1953F412C126}" type="datetimeFigureOut">
               <a:rPr lang="en-US" dirty="0"/>
               <a:pPr/>
-              <a:t>7/3/2019</a:t>
+              <a:t>7/9/2019</a:t>
             </a:fld>
             <a:endParaRPr lang="en-US" dirty="0"/>
           </a:p>
@@ -1558,7 +1558,7 @@
             <a:fld id="{48A87A34-81AB-432B-8DAE-1953F412C126}" type="datetimeFigureOut">
               <a:rPr lang="en-US" dirty="0"/>
               <a:pPr/>
-              <a:t>7/3/2019</a:t>
+              <a:t>7/9/2019</a:t>
             </a:fld>
             <a:endParaRPr lang="en-US" dirty="0"/>
           </a:p>
@@ -2100,7 +2100,7 @@
           <a:p>
             <a:fld id="{48A87A34-81AB-432B-8DAE-1953F412C126}" type="datetimeFigureOut">
               <a:rPr lang="en-US" dirty="0"/>
-              <a:t>7/3/2019</a:t>
+              <a:t>7/9/2019</a:t>
             </a:fld>
             <a:endParaRPr lang="en-US" dirty="0"/>
           </a:p>
@@ -2869,7 +2869,7 @@
           <a:p>
             <a:fld id="{48A87A34-81AB-432B-8DAE-1953F412C126}" type="datetimeFigureOut">
               <a:rPr lang="en-US" dirty="0"/>
-              <a:t>7/3/2019</a:t>
+              <a:t>7/9/2019</a:t>
             </a:fld>
             <a:endParaRPr lang="en-US" dirty="0"/>
           </a:p>
@@ -3039,7 +3039,7 @@
           <a:p>
             <a:fld id="{48A87A34-81AB-432B-8DAE-1953F412C126}" type="datetimeFigureOut">
               <a:rPr lang="en-US" dirty="0"/>
-              <a:t>7/3/2019</a:t>
+              <a:t>7/9/2019</a:t>
             </a:fld>
             <a:endParaRPr lang="en-US" dirty="0"/>
           </a:p>
@@ -3258,7 +3258,7 @@
             <a:fld id="{48A87A34-81AB-432B-8DAE-1953F412C126}" type="datetimeFigureOut">
               <a:rPr lang="en-US" dirty="0"/>
               <a:pPr/>
-              <a:t>7/3/2019</a:t>
+              <a:t>7/9/2019</a:t>
             </a:fld>
             <a:endParaRPr lang="en-US" dirty="0"/>
           </a:p>
@@ -3433,7 +3433,7 @@
           <a:p>
             <a:fld id="{48A87A34-81AB-432B-8DAE-1953F412C126}" type="datetimeFigureOut">
               <a:rPr lang="en-US" dirty="0"/>
-              <a:t>7/3/2019</a:t>
+              <a:t>7/9/2019</a:t>
             </a:fld>
             <a:endParaRPr lang="en-US" dirty="0"/>
           </a:p>
@@ -3718,7 +3718,7 @@
             <a:fld id="{48A87A34-81AB-432B-8DAE-1953F412C126}" type="datetimeFigureOut">
               <a:rPr lang="en-US" dirty="0"/>
               <a:pPr/>
-              <a:t>7/3/2019</a:t>
+              <a:t>7/9/2019</a:t>
             </a:fld>
             <a:endParaRPr lang="en-US" dirty="0"/>
           </a:p>
@@ -3955,7 +3955,7 @@
           <a:p>
             <a:fld id="{48A87A34-81AB-432B-8DAE-1953F412C126}" type="datetimeFigureOut">
               <a:rPr lang="en-US" dirty="0"/>
-              <a:t>7/3/2019</a:t>
+              <a:t>7/9/2019</a:t>
             </a:fld>
             <a:endParaRPr lang="en-US" dirty="0"/>
           </a:p>
@@ -4329,7 +4329,7 @@
           <a:p>
             <a:fld id="{48A87A34-81AB-432B-8DAE-1953F412C126}" type="datetimeFigureOut">
               <a:rPr lang="en-US" dirty="0"/>
-              <a:t>7/3/2019</a:t>
+              <a:t>7/9/2019</a:t>
             </a:fld>
             <a:endParaRPr lang="en-US" dirty="0"/>
           </a:p>
@@ -4442,7 +4442,7 @@
           <a:p>
             <a:fld id="{48A87A34-81AB-432B-8DAE-1953F412C126}" type="datetimeFigureOut">
               <a:rPr lang="en-US" dirty="0"/>
-              <a:t>7/3/2019</a:t>
+              <a:t>7/9/2019</a:t>
             </a:fld>
             <a:endParaRPr lang="en-US" dirty="0"/>
           </a:p>
@@ -4532,7 +4532,7 @@
           <a:p>
             <a:fld id="{48A87A34-81AB-432B-8DAE-1953F412C126}" type="datetimeFigureOut">
               <a:rPr lang="en-US" dirty="0"/>
-              <a:t>7/3/2019</a:t>
+              <a:t>7/9/2019</a:t>
             </a:fld>
             <a:endParaRPr lang="en-US" dirty="0"/>
           </a:p>
@@ -4776,7 +4776,7 @@
           <a:p>
             <a:fld id="{48A87A34-81AB-432B-8DAE-1953F412C126}" type="datetimeFigureOut">
               <a:rPr lang="en-US" dirty="0"/>
-              <a:t>7/3/2019</a:t>
+              <a:t>7/9/2019</a:t>
             </a:fld>
             <a:endParaRPr lang="en-US" dirty="0"/>
           </a:p>
@@ -5028,7 +5028,7 @@
           <a:p>
             <a:fld id="{48A87A34-81AB-432B-8DAE-1953F412C126}" type="datetimeFigureOut">
               <a:rPr lang="en-US" dirty="0"/>
-              <a:t>7/3/2019</a:t>
+              <a:t>7/9/2019</a:t>
             </a:fld>
             <a:endParaRPr lang="en-US" dirty="0"/>
           </a:p>
@@ -5267,7 +5267,7 @@
             <a:fld id="{48A87A34-81AB-432B-8DAE-1953F412C126}" type="datetimeFigureOut">
               <a:rPr lang="en-US" dirty="0"/>
               <a:pPr/>
-              <a:t>7/3/2019</a:t>
+              <a:t>7/9/2019</a:t>
             </a:fld>
             <a:endParaRPr lang="en-US" dirty="0"/>
           </a:p>
@@ -6173,7 +6173,7 @@
               <a:rPr lang="en-US" dirty="0">
                 <a:hlinkClick r:id="rId5"/>
               </a:rPr>
-              <a:t>https://github.com/harishbk77/jsoverload_final.git</a:t>
+              <a:t>https://github.com/CyEdmonds/JS_Project_Sub.git</a:t>
             </a:r>
             <a:endParaRPr lang="en-US" dirty="0"/>
           </a:p>
@@ -6183,7 +6183,7 @@
               <a:rPr lang="en-US" dirty="0">
                 <a:hlinkClick r:id="rId6"/>
               </a:rPr>
-              <a:t>https://github.com/bellissima0419/js_overload.git</a:t>
+              <a:t>https://github.com/harishbk77/jsoverload_final.git</a:t>
             </a:r>
             <a:endParaRPr lang="en-US" dirty="0"/>
           </a:p>
@@ -6192,6 +6192,16 @@
             <a:r>
               <a:rPr lang="en-US" dirty="0">
                 <a:hlinkClick r:id="rId7"/>
+              </a:rPr>
+              <a:t>https://github.com/bellissima0419/js_overload.git</a:t>
+            </a:r>
+            <a:endParaRPr lang="en-US" dirty="0"/>
+          </a:p>
+          <a:p>
+            <a:pPr lvl="1"/>
+            <a:r>
+              <a:rPr lang="en-US" dirty="0">
+                <a:hlinkClick r:id="rId8"/>
               </a:rPr>
               <a:t>https://github.com/franklingonzales/Project_3_Developer_Survey_2019.git</a:t>
             </a:r>

</xml_diff>